<commit_message>
Adding models and ppt details.
</commit_message>
<xml_diff>
--- a/Chapter10-EvaluatingModels/Chapter10.pptx
+++ b/Chapter10-EvaluatingModels/Chapter10.pptx
@@ -4,8 +4,12 @@
   <p:sldMasterIdLst>
     <p:sldMasterId id="2147483648" r:id="rId1"/>
   </p:sldMasterIdLst>
+  <p:notesMasterIdLst>
+    <p:notesMasterId r:id="rId4"/>
+  </p:notesMasterIdLst>
   <p:sldIdLst>
     <p:sldId id="256" r:id="rId2"/>
+    <p:sldId id="257" r:id="rId3"/>
   </p:sldIdLst>
   <p:sldSz cx="12192000" cy="6858000"/>
   <p:notesSz cx="6858000" cy="9144000"/>
@@ -110,6 +114,546 @@
     </p:ext>
   </p:extLst>
 </p:presentation>
+</file>
+
+<file path=ppt/notesMasters/notesMaster1.xml><?xml version="1.0" encoding="utf-8"?>
+<p:notesMaster xmlns:a="http://schemas.openxmlformats.org/drawingml/2006/main" xmlns:r="http://schemas.openxmlformats.org/officeDocument/2006/relationships" xmlns:p="http://schemas.openxmlformats.org/presentationml/2006/main">
+  <p:cSld>
+    <p:bg>
+      <p:bgRef idx="1001">
+        <a:schemeClr val="bg1"/>
+      </p:bgRef>
+    </p:bg>
+    <p:spTree>
+      <p:nvGrpSpPr>
+        <p:cNvPr id="1" name=""/>
+        <p:cNvGrpSpPr/>
+        <p:nvPr/>
+      </p:nvGrpSpPr>
+      <p:grpSpPr>
+        <a:xfrm>
+          <a:off x="0" y="0"/>
+          <a:ext cx="0" cy="0"/>
+          <a:chOff x="0" y="0"/>
+          <a:chExt cx="0" cy="0"/>
+        </a:xfrm>
+      </p:grpSpPr>
+      <p:sp>
+        <p:nvSpPr>
+          <p:cNvPr id="2" name="Header Placeholder 1"/>
+          <p:cNvSpPr>
+            <a:spLocks noGrp="1"/>
+          </p:cNvSpPr>
+          <p:nvPr>
+            <p:ph type="hdr" sz="quarter"/>
+          </p:nvPr>
+        </p:nvSpPr>
+        <p:spPr>
+          <a:xfrm>
+            <a:off x="0" y="0"/>
+            <a:ext cx="2971800" cy="458788"/>
+          </a:xfrm>
+          <a:prstGeom prst="rect">
+            <a:avLst/>
+          </a:prstGeom>
+        </p:spPr>
+        <p:txBody>
+          <a:bodyPr vert="horz" lIns="91440" tIns="45720" rIns="91440" bIns="45720" rtlCol="0"/>
+          <a:lstStyle>
+            <a:lvl1pPr algn="l">
+              <a:defRPr sz="1200"/>
+            </a:lvl1pPr>
+          </a:lstStyle>
+          <a:p>
+            <a:endParaRPr lang="en-US"/>
+          </a:p>
+        </p:txBody>
+      </p:sp>
+      <p:sp>
+        <p:nvSpPr>
+          <p:cNvPr id="3" name="Date Placeholder 2"/>
+          <p:cNvSpPr>
+            <a:spLocks noGrp="1"/>
+          </p:cNvSpPr>
+          <p:nvPr>
+            <p:ph type="dt" idx="1"/>
+          </p:nvPr>
+        </p:nvSpPr>
+        <p:spPr>
+          <a:xfrm>
+            <a:off x="3884613" y="0"/>
+            <a:ext cx="2971800" cy="458788"/>
+          </a:xfrm>
+          <a:prstGeom prst="rect">
+            <a:avLst/>
+          </a:prstGeom>
+        </p:spPr>
+        <p:txBody>
+          <a:bodyPr vert="horz" lIns="91440" tIns="45720" rIns="91440" bIns="45720" rtlCol="0"/>
+          <a:lstStyle>
+            <a:lvl1pPr algn="r">
+              <a:defRPr sz="1200"/>
+            </a:lvl1pPr>
+          </a:lstStyle>
+          <a:p>
+            <a:fld id="{8D8DE39F-4749-5543-BEF0-EE11E597C9A3}" type="datetimeFigureOut">
+              <a:rPr lang="en-US" smtClean="0"/>
+              <a:t>7/21/18</a:t>
+            </a:fld>
+            <a:endParaRPr lang="en-US"/>
+          </a:p>
+        </p:txBody>
+      </p:sp>
+      <p:sp>
+        <p:nvSpPr>
+          <p:cNvPr id="4" name="Slide Image Placeholder 3"/>
+          <p:cNvSpPr>
+            <a:spLocks noGrp="1" noRot="1" noChangeAspect="1"/>
+          </p:cNvSpPr>
+          <p:nvPr>
+            <p:ph type="sldImg" idx="2"/>
+          </p:nvPr>
+        </p:nvSpPr>
+        <p:spPr>
+          <a:xfrm>
+            <a:off x="685800" y="1143000"/>
+            <a:ext cx="5486400" cy="3086100"/>
+          </a:xfrm>
+          <a:prstGeom prst="rect">
+            <a:avLst/>
+          </a:prstGeom>
+          <a:noFill/>
+          <a:ln w="12700">
+            <a:solidFill>
+              <a:prstClr val="black"/>
+            </a:solidFill>
+          </a:ln>
+        </p:spPr>
+        <p:txBody>
+          <a:bodyPr vert="horz" lIns="91440" tIns="45720" rIns="91440" bIns="45720" rtlCol="0" anchor="ctr"/>
+          <a:lstStyle/>
+          <a:p>
+            <a:endParaRPr lang="en-US"/>
+          </a:p>
+        </p:txBody>
+      </p:sp>
+      <p:sp>
+        <p:nvSpPr>
+          <p:cNvPr id="5" name="Notes Placeholder 4"/>
+          <p:cNvSpPr>
+            <a:spLocks noGrp="1"/>
+          </p:cNvSpPr>
+          <p:nvPr>
+            <p:ph type="body" sz="quarter" idx="3"/>
+          </p:nvPr>
+        </p:nvSpPr>
+        <p:spPr>
+          <a:xfrm>
+            <a:off x="685800" y="4400550"/>
+            <a:ext cx="5486400" cy="3600450"/>
+          </a:xfrm>
+          <a:prstGeom prst="rect">
+            <a:avLst/>
+          </a:prstGeom>
+        </p:spPr>
+        <p:txBody>
+          <a:bodyPr vert="horz" lIns="91440" tIns="45720" rIns="91440" bIns="45720" rtlCol="0"/>
+          <a:lstStyle/>
+          <a:p>
+            <a:pPr lvl="0"/>
+            <a:r>
+              <a:rPr lang="en-US"/>
+              <a:t>Edit Master text styles</a:t>
+            </a:r>
+          </a:p>
+          <a:p>
+            <a:pPr lvl="1"/>
+            <a:r>
+              <a:rPr lang="en-US"/>
+              <a:t>Second level</a:t>
+            </a:r>
+          </a:p>
+          <a:p>
+            <a:pPr lvl="2"/>
+            <a:r>
+              <a:rPr lang="en-US"/>
+              <a:t>Third level</a:t>
+            </a:r>
+          </a:p>
+          <a:p>
+            <a:pPr lvl="3"/>
+            <a:r>
+              <a:rPr lang="en-US"/>
+              <a:t>Fourth level</a:t>
+            </a:r>
+          </a:p>
+          <a:p>
+            <a:pPr lvl="4"/>
+            <a:r>
+              <a:rPr lang="en-US"/>
+              <a:t>Fifth level</a:t>
+            </a:r>
+          </a:p>
+        </p:txBody>
+      </p:sp>
+      <p:sp>
+        <p:nvSpPr>
+          <p:cNvPr id="6" name="Footer Placeholder 5"/>
+          <p:cNvSpPr>
+            <a:spLocks noGrp="1"/>
+          </p:cNvSpPr>
+          <p:nvPr>
+            <p:ph type="ftr" sz="quarter" idx="4"/>
+          </p:nvPr>
+        </p:nvSpPr>
+        <p:spPr>
+          <a:xfrm>
+            <a:off x="0" y="8685213"/>
+            <a:ext cx="2971800" cy="458787"/>
+          </a:xfrm>
+          <a:prstGeom prst="rect">
+            <a:avLst/>
+          </a:prstGeom>
+        </p:spPr>
+        <p:txBody>
+          <a:bodyPr vert="horz" lIns="91440" tIns="45720" rIns="91440" bIns="45720" rtlCol="0" anchor="b"/>
+          <a:lstStyle>
+            <a:lvl1pPr algn="l">
+              <a:defRPr sz="1200"/>
+            </a:lvl1pPr>
+          </a:lstStyle>
+          <a:p>
+            <a:endParaRPr lang="en-US"/>
+          </a:p>
+        </p:txBody>
+      </p:sp>
+      <p:sp>
+        <p:nvSpPr>
+          <p:cNvPr id="7" name="Slide Number Placeholder 6"/>
+          <p:cNvSpPr>
+            <a:spLocks noGrp="1"/>
+          </p:cNvSpPr>
+          <p:nvPr>
+            <p:ph type="sldNum" sz="quarter" idx="5"/>
+          </p:nvPr>
+        </p:nvSpPr>
+        <p:spPr>
+          <a:xfrm>
+            <a:off x="3884613" y="8685213"/>
+            <a:ext cx="2971800" cy="458787"/>
+          </a:xfrm>
+          <a:prstGeom prst="rect">
+            <a:avLst/>
+          </a:prstGeom>
+        </p:spPr>
+        <p:txBody>
+          <a:bodyPr vert="horz" lIns="91440" tIns="45720" rIns="91440" bIns="45720" rtlCol="0" anchor="b"/>
+          <a:lstStyle>
+            <a:lvl1pPr algn="r">
+              <a:defRPr sz="1200"/>
+            </a:lvl1pPr>
+          </a:lstStyle>
+          <a:p>
+            <a:fld id="{62C0D1B9-B7E0-F54B-8D0C-8679F12BC84B}" type="slidenum">
+              <a:rPr lang="en-US" smtClean="0"/>
+              <a:t>‹#›</a:t>
+            </a:fld>
+            <a:endParaRPr lang="en-US"/>
+          </a:p>
+        </p:txBody>
+      </p:sp>
+    </p:spTree>
+    <p:extLst>
+      <p:ext uri="{BB962C8B-B14F-4D97-AF65-F5344CB8AC3E}">
+        <p14:creationId xmlns:p14="http://schemas.microsoft.com/office/powerpoint/2010/main" val="373857653"/>
+      </p:ext>
+    </p:extLst>
+  </p:cSld>
+  <p:clrMap bg1="lt1" tx1="dk1" bg2="lt2" tx2="dk2" accent1="accent1" accent2="accent2" accent3="accent3" accent4="accent4" accent5="accent5" accent6="accent6" hlink="hlink" folHlink="folHlink"/>
+  <p:notesStyle>
+    <a:lvl1pPr marL="0" algn="l" defTabSz="914400" rtl="0" eaLnBrk="1" latinLnBrk="0" hangingPunct="1">
+      <a:defRPr sz="1200" kern="1200">
+        <a:solidFill>
+          <a:schemeClr val="tx1"/>
+        </a:solidFill>
+        <a:latin typeface="+mn-lt"/>
+        <a:ea typeface="+mn-ea"/>
+        <a:cs typeface="+mn-cs"/>
+      </a:defRPr>
+    </a:lvl1pPr>
+    <a:lvl2pPr marL="457200" algn="l" defTabSz="914400" rtl="0" eaLnBrk="1" latinLnBrk="0" hangingPunct="1">
+      <a:defRPr sz="1200" kern="1200">
+        <a:solidFill>
+          <a:schemeClr val="tx1"/>
+        </a:solidFill>
+        <a:latin typeface="+mn-lt"/>
+        <a:ea typeface="+mn-ea"/>
+        <a:cs typeface="+mn-cs"/>
+      </a:defRPr>
+    </a:lvl2pPr>
+    <a:lvl3pPr marL="914400" algn="l" defTabSz="914400" rtl="0" eaLnBrk="1" latinLnBrk="0" hangingPunct="1">
+      <a:defRPr sz="1200" kern="1200">
+        <a:solidFill>
+          <a:schemeClr val="tx1"/>
+        </a:solidFill>
+        <a:latin typeface="+mn-lt"/>
+        <a:ea typeface="+mn-ea"/>
+        <a:cs typeface="+mn-cs"/>
+      </a:defRPr>
+    </a:lvl3pPr>
+    <a:lvl4pPr marL="1371600" algn="l" defTabSz="914400" rtl="0" eaLnBrk="1" latinLnBrk="0" hangingPunct="1">
+      <a:defRPr sz="1200" kern="1200">
+        <a:solidFill>
+          <a:schemeClr val="tx1"/>
+        </a:solidFill>
+        <a:latin typeface="+mn-lt"/>
+        <a:ea typeface="+mn-ea"/>
+        <a:cs typeface="+mn-cs"/>
+      </a:defRPr>
+    </a:lvl4pPr>
+    <a:lvl5pPr marL="1828800" algn="l" defTabSz="914400" rtl="0" eaLnBrk="1" latinLnBrk="0" hangingPunct="1">
+      <a:defRPr sz="1200" kern="1200">
+        <a:solidFill>
+          <a:schemeClr val="tx1"/>
+        </a:solidFill>
+        <a:latin typeface="+mn-lt"/>
+        <a:ea typeface="+mn-ea"/>
+        <a:cs typeface="+mn-cs"/>
+      </a:defRPr>
+    </a:lvl5pPr>
+    <a:lvl6pPr marL="2286000" algn="l" defTabSz="914400" rtl="0" eaLnBrk="1" latinLnBrk="0" hangingPunct="1">
+      <a:defRPr sz="1200" kern="1200">
+        <a:solidFill>
+          <a:schemeClr val="tx1"/>
+        </a:solidFill>
+        <a:latin typeface="+mn-lt"/>
+        <a:ea typeface="+mn-ea"/>
+        <a:cs typeface="+mn-cs"/>
+      </a:defRPr>
+    </a:lvl6pPr>
+    <a:lvl7pPr marL="2743200" algn="l" defTabSz="914400" rtl="0" eaLnBrk="1" latinLnBrk="0" hangingPunct="1">
+      <a:defRPr sz="1200" kern="1200">
+        <a:solidFill>
+          <a:schemeClr val="tx1"/>
+        </a:solidFill>
+        <a:latin typeface="+mn-lt"/>
+        <a:ea typeface="+mn-ea"/>
+        <a:cs typeface="+mn-cs"/>
+      </a:defRPr>
+    </a:lvl7pPr>
+    <a:lvl8pPr marL="3200400" algn="l" defTabSz="914400" rtl="0" eaLnBrk="1" latinLnBrk="0" hangingPunct="1">
+      <a:defRPr sz="1200" kern="1200">
+        <a:solidFill>
+          <a:schemeClr val="tx1"/>
+        </a:solidFill>
+        <a:latin typeface="+mn-lt"/>
+        <a:ea typeface="+mn-ea"/>
+        <a:cs typeface="+mn-cs"/>
+      </a:defRPr>
+    </a:lvl8pPr>
+    <a:lvl9pPr marL="3657600" algn="l" defTabSz="914400" rtl="0" eaLnBrk="1" latinLnBrk="0" hangingPunct="1">
+      <a:defRPr sz="1200" kern="1200">
+        <a:solidFill>
+          <a:schemeClr val="tx1"/>
+        </a:solidFill>
+        <a:latin typeface="+mn-lt"/>
+        <a:ea typeface="+mn-ea"/>
+        <a:cs typeface="+mn-cs"/>
+      </a:defRPr>
+    </a:lvl9pPr>
+  </p:notesStyle>
+</p:notesMaster>
+</file>
+
+<file path=ppt/notesSlides/notesSlide1.xml><?xml version="1.0" encoding="utf-8"?>
+<p:notes xmlns:a="http://schemas.openxmlformats.org/drawingml/2006/main" xmlns:r="http://schemas.openxmlformats.org/officeDocument/2006/relationships" xmlns:p="http://schemas.openxmlformats.org/presentationml/2006/main">
+  <p:cSld>
+    <p:spTree>
+      <p:nvGrpSpPr>
+        <p:cNvPr id="1" name=""/>
+        <p:cNvGrpSpPr/>
+        <p:nvPr/>
+      </p:nvGrpSpPr>
+      <p:grpSpPr>
+        <a:xfrm>
+          <a:off x="0" y="0"/>
+          <a:ext cx="0" cy="0"/>
+          <a:chOff x="0" y="0"/>
+          <a:chExt cx="0" cy="0"/>
+        </a:xfrm>
+      </p:grpSpPr>
+      <p:sp>
+        <p:nvSpPr>
+          <p:cNvPr id="2" name="Slide Image Placeholder 1"/>
+          <p:cNvSpPr>
+            <a:spLocks noGrp="1" noRot="1" noChangeAspect="1"/>
+          </p:cNvSpPr>
+          <p:nvPr>
+            <p:ph type="sldImg"/>
+          </p:nvPr>
+        </p:nvSpPr>
+        <p:spPr/>
+      </p:sp>
+      <p:sp>
+        <p:nvSpPr>
+          <p:cNvPr id="3" name="Notes Placeholder 2"/>
+          <p:cNvSpPr>
+            <a:spLocks noGrp="1"/>
+          </p:cNvSpPr>
+          <p:nvPr>
+            <p:ph type="body" idx="1"/>
+          </p:nvPr>
+        </p:nvSpPr>
+        <p:spPr/>
+        <p:txBody>
+          <a:bodyPr/>
+          <a:lstStyle/>
+          <a:p>
+            <a:pPr marL="0" marR="0" lvl="0" indent="0" algn="l" defTabSz="914400" rtl="0" eaLnBrk="1" fontAlgn="auto" latinLnBrk="0" hangingPunct="1">
+              <a:lnSpc>
+                <a:spcPct val="100000"/>
+              </a:lnSpc>
+              <a:spcBef>
+                <a:spcPts val="0"/>
+              </a:spcBef>
+              <a:spcAft>
+                <a:spcPts val="0"/>
+              </a:spcAft>
+              <a:buClrTx/>
+              <a:buSzTx/>
+              <a:buFontTx/>
+              <a:buNone/>
+              <a:tabLst/>
+              <a:defRPr/>
+            </a:pPr>
+            <a:r>
+              <a:rPr lang="en-US" dirty="0"/>
+              <a:t>Model evaluation is one of the central challenges associated with agent-based models. A key question that all modelers face is “how well does this model simulate the phenomenon of interest?”. While there are no universally accepted methods for evaluating agent-based models, researchers often adopt the same three stage process of verification, calibration and validation. This chapter presents an overview of the methods that are commonly used within each of these stages. The overarching aim of this chapter is to provide the reader with the knowledge to design their own approach to evaluating agent-based models.</a:t>
+            </a:r>
+          </a:p>
+          <a:p>
+            <a:endParaRPr lang="en-US" dirty="0"/>
+          </a:p>
+        </p:txBody>
+      </p:sp>
+      <p:sp>
+        <p:nvSpPr>
+          <p:cNvPr id="4" name="Slide Number Placeholder 3"/>
+          <p:cNvSpPr>
+            <a:spLocks noGrp="1"/>
+          </p:cNvSpPr>
+          <p:nvPr>
+            <p:ph type="sldNum" sz="quarter" idx="10"/>
+          </p:nvPr>
+        </p:nvSpPr>
+        <p:spPr/>
+        <p:txBody>
+          <a:bodyPr/>
+          <a:lstStyle/>
+          <a:p>
+            <a:fld id="{62C0D1B9-B7E0-F54B-8D0C-8679F12BC84B}" type="slidenum">
+              <a:rPr lang="en-US" smtClean="0"/>
+              <a:t>1</a:t>
+            </a:fld>
+            <a:endParaRPr lang="en-US"/>
+          </a:p>
+        </p:txBody>
+      </p:sp>
+    </p:spTree>
+    <p:extLst>
+      <p:ext uri="{BB962C8B-B14F-4D97-AF65-F5344CB8AC3E}">
+        <p14:creationId xmlns:p14="http://schemas.microsoft.com/office/powerpoint/2010/main" val="3063833972"/>
+      </p:ext>
+    </p:extLst>
+  </p:cSld>
+  <p:clrMapOvr>
+    <a:masterClrMapping/>
+  </p:clrMapOvr>
+</p:notes>
+</file>
+
+<file path=ppt/notesSlides/notesSlide2.xml><?xml version="1.0" encoding="utf-8"?>
+<p:notes xmlns:a="http://schemas.openxmlformats.org/drawingml/2006/main" xmlns:r="http://schemas.openxmlformats.org/officeDocument/2006/relationships" xmlns:p="http://schemas.openxmlformats.org/presentationml/2006/main">
+  <p:cSld>
+    <p:spTree>
+      <p:nvGrpSpPr>
+        <p:cNvPr id="1" name=""/>
+        <p:cNvGrpSpPr/>
+        <p:nvPr/>
+      </p:nvGrpSpPr>
+      <p:grpSpPr>
+        <a:xfrm>
+          <a:off x="0" y="0"/>
+          <a:ext cx="0" cy="0"/>
+          <a:chOff x="0" y="0"/>
+          <a:chExt cx="0" cy="0"/>
+        </a:xfrm>
+      </p:grpSpPr>
+      <p:sp>
+        <p:nvSpPr>
+          <p:cNvPr id="2" name="Slide Image Placeholder 1"/>
+          <p:cNvSpPr>
+            <a:spLocks noGrp="1" noRot="1" noChangeAspect="1"/>
+          </p:cNvSpPr>
+          <p:nvPr>
+            <p:ph type="sldImg"/>
+          </p:nvPr>
+        </p:nvSpPr>
+        <p:spPr/>
+      </p:sp>
+      <p:sp>
+        <p:nvSpPr>
+          <p:cNvPr id="3" name="Notes Placeholder 2"/>
+          <p:cNvSpPr>
+            <a:spLocks noGrp="1"/>
+          </p:cNvSpPr>
+          <p:nvPr>
+            <p:ph type="body" idx="1"/>
+          </p:nvPr>
+        </p:nvSpPr>
+        <p:spPr/>
+        <p:txBody>
+          <a:bodyPr/>
+          <a:lstStyle/>
+          <a:p>
+            <a:endParaRPr lang="en-US" dirty="0"/>
+          </a:p>
+        </p:txBody>
+      </p:sp>
+      <p:sp>
+        <p:nvSpPr>
+          <p:cNvPr id="4" name="Slide Number Placeholder 3"/>
+          <p:cNvSpPr>
+            <a:spLocks noGrp="1"/>
+          </p:cNvSpPr>
+          <p:nvPr>
+            <p:ph type="sldNum" sz="quarter" idx="10"/>
+          </p:nvPr>
+        </p:nvSpPr>
+        <p:spPr/>
+        <p:txBody>
+          <a:bodyPr/>
+          <a:lstStyle/>
+          <a:p>
+            <a:fld id="{62C0D1B9-B7E0-F54B-8D0C-8679F12BC84B}" type="slidenum">
+              <a:rPr lang="en-US" smtClean="0"/>
+              <a:t>2</a:t>
+            </a:fld>
+            <a:endParaRPr lang="en-US"/>
+          </a:p>
+        </p:txBody>
+      </p:sp>
+    </p:spTree>
+    <p:extLst>
+      <p:ext uri="{BB962C8B-B14F-4D97-AF65-F5344CB8AC3E}">
+        <p14:creationId xmlns:p14="http://schemas.microsoft.com/office/powerpoint/2010/main" val="2847153721"/>
+      </p:ext>
+    </p:extLst>
+  </p:cSld>
+  <p:clrMapOvr>
+    <a:masterClrMapping/>
+  </p:clrMapOvr>
+</p:notes>
 </file>
 
 <file path=ppt/slideLayouts/slideLayout1.xml><?xml version="1.0" encoding="utf-8"?>
@@ -3376,7 +3920,7 @@
           <a:lstStyle/>
           <a:p>
             <a:r>
-              <a:rPr lang="en-US"/>
+              <a:rPr lang="en-US" dirty="0"/>
               <a:t>Evaluating Our Models: Verification, Calibration, Validation</a:t>
             </a:r>
           </a:p>
@@ -3386,6 +3930,89 @@
     <p:extLst>
       <p:ext uri="{BB962C8B-B14F-4D97-AF65-F5344CB8AC3E}">
         <p14:creationId xmlns:p14="http://schemas.microsoft.com/office/powerpoint/2010/main" val="27190754"/>
+      </p:ext>
+    </p:extLst>
+  </p:cSld>
+  <p:clrMapOvr>
+    <a:masterClrMapping/>
+  </p:clrMapOvr>
+</p:sld>
+</file>
+
+<file path=ppt/slides/slide2.xml><?xml version="1.0" encoding="utf-8"?>
+<p:sld xmlns:a="http://schemas.openxmlformats.org/drawingml/2006/main" xmlns:r="http://schemas.openxmlformats.org/officeDocument/2006/relationships" xmlns:p="http://schemas.openxmlformats.org/presentationml/2006/main">
+  <p:cSld>
+    <p:spTree>
+      <p:nvGrpSpPr>
+        <p:cNvPr id="1" name=""/>
+        <p:cNvGrpSpPr/>
+        <p:nvPr/>
+      </p:nvGrpSpPr>
+      <p:grpSpPr>
+        <a:xfrm>
+          <a:off x="0" y="0"/>
+          <a:ext cx="0" cy="0"/>
+          <a:chOff x="0" y="0"/>
+          <a:chExt cx="0" cy="0"/>
+        </a:xfrm>
+      </p:grpSpPr>
+      <p:sp>
+        <p:nvSpPr>
+          <p:cNvPr id="2" name="Title 1">
+            <a:extLst>
+              <a:ext uri="{FF2B5EF4-FFF2-40B4-BE49-F238E27FC236}">
+                <a16:creationId xmlns:a16="http://schemas.microsoft.com/office/drawing/2014/main" id="{404FFA3E-60BC-9E45-9B7C-382A0B607EC8}"/>
+              </a:ext>
+            </a:extLst>
+          </p:cNvPr>
+          <p:cNvSpPr>
+            <a:spLocks noGrp="1"/>
+          </p:cNvSpPr>
+          <p:nvPr>
+            <p:ph type="title"/>
+          </p:nvPr>
+        </p:nvSpPr>
+        <p:spPr/>
+        <p:txBody>
+          <a:bodyPr/>
+          <a:lstStyle/>
+          <a:p>
+            <a:r>
+              <a:rPr lang="en-US"/>
+              <a:t>Evaluating Models: An Overview</a:t>
+            </a:r>
+          </a:p>
+        </p:txBody>
+      </p:sp>
+      <p:sp>
+        <p:nvSpPr>
+          <p:cNvPr id="3" name="Content Placeholder 2">
+            <a:extLst>
+              <a:ext uri="{FF2B5EF4-FFF2-40B4-BE49-F238E27FC236}">
+                <a16:creationId xmlns:a16="http://schemas.microsoft.com/office/drawing/2014/main" id="{A84748F5-1F81-E54D-9002-CDD205E01386}"/>
+              </a:ext>
+            </a:extLst>
+          </p:cNvPr>
+          <p:cNvSpPr>
+            <a:spLocks noGrp="1"/>
+          </p:cNvSpPr>
+          <p:nvPr>
+            <p:ph idx="1"/>
+          </p:nvPr>
+        </p:nvSpPr>
+        <p:spPr/>
+        <p:txBody>
+          <a:bodyPr/>
+          <a:lstStyle/>
+          <a:p>
+            <a:endParaRPr lang="en-US"/>
+          </a:p>
+        </p:txBody>
+      </p:sp>
+    </p:spTree>
+    <p:extLst>
+      <p:ext uri="{BB962C8B-B14F-4D97-AF65-F5344CB8AC3E}">
+        <p14:creationId xmlns:p14="http://schemas.microsoft.com/office/powerpoint/2010/main" val="3823164617"/>
       </p:ext>
     </p:extLst>
   </p:cSld>
@@ -3688,4 +4315,299 @@
     </a:ext>
   </a:extLst>
 </a:theme>
+</file>
+
+<file path=ppt/theme/theme2.xml><?xml version="1.0" encoding="utf-8"?>
+<a:theme xmlns:a="http://schemas.openxmlformats.org/drawingml/2006/main" name="Office Theme">
+  <a:themeElements>
+    <a:clrScheme name="Office">
+      <a:dk1>
+        <a:sysClr val="windowText" lastClr="000000"/>
+      </a:dk1>
+      <a:lt1>
+        <a:sysClr val="window" lastClr="FFFFFF"/>
+      </a:lt1>
+      <a:dk2>
+        <a:srgbClr val="44546A"/>
+      </a:dk2>
+      <a:lt2>
+        <a:srgbClr val="E7E6E6"/>
+      </a:lt2>
+      <a:accent1>
+        <a:srgbClr val="4472C4"/>
+      </a:accent1>
+      <a:accent2>
+        <a:srgbClr val="ED7D31"/>
+      </a:accent2>
+      <a:accent3>
+        <a:srgbClr val="A5A5A5"/>
+      </a:accent3>
+      <a:accent4>
+        <a:srgbClr val="FFC000"/>
+      </a:accent4>
+      <a:accent5>
+        <a:srgbClr val="5B9BD5"/>
+      </a:accent5>
+      <a:accent6>
+        <a:srgbClr val="70AD47"/>
+      </a:accent6>
+      <a:hlink>
+        <a:srgbClr val="0563C1"/>
+      </a:hlink>
+      <a:folHlink>
+        <a:srgbClr val="954F72"/>
+      </a:folHlink>
+    </a:clrScheme>
+    <a:fontScheme name="Office">
+      <a:majorFont>
+        <a:latin typeface="Calibri Light" panose="020F0302020204030204"/>
+        <a:ea typeface=""/>
+        <a:cs typeface=""/>
+        <a:font script="Jpan" typeface="游ゴシック Light"/>
+        <a:font script="Hang" typeface="맑은 고딕"/>
+        <a:font script="Hans" typeface="等线 Light"/>
+        <a:font script="Hant" typeface="新細明體"/>
+        <a:font script="Arab" typeface="Times New Roman"/>
+        <a:font script="Hebr" typeface="Times New Roman"/>
+        <a:font script="Thai" typeface="Angsana New"/>
+        <a:font script="Ethi" typeface="Nyala"/>
+        <a:font script="Beng" typeface="Vrinda"/>
+        <a:font script="Gujr" typeface="Shruti"/>
+        <a:font script="Khmr" typeface="MoolBoran"/>
+        <a:font script="Knda" typeface="Tunga"/>
+        <a:font script="Guru" typeface="Raavi"/>
+        <a:font script="Cans" typeface="Euphemia"/>
+        <a:font script="Cher" typeface="Plantagenet Cherokee"/>
+        <a:font script="Yiii" typeface="Microsoft Yi Baiti"/>
+        <a:font script="Tibt" typeface="Microsoft Himalaya"/>
+        <a:font script="Thaa" typeface="MV Boli"/>
+        <a:font script="Deva" typeface="Mangal"/>
+        <a:font script="Telu" typeface="Gautami"/>
+        <a:font script="Taml" typeface="Latha"/>
+        <a:font script="Syrc" typeface="Estrangelo Edessa"/>
+        <a:font script="Orya" typeface="Kalinga"/>
+        <a:font script="Mlym" typeface="Kartika"/>
+        <a:font script="Laoo" typeface="DokChampa"/>
+        <a:font script="Sinh" typeface="Iskoola Pota"/>
+        <a:font script="Mong" typeface="Mongolian Baiti"/>
+        <a:font script="Viet" typeface="Times New Roman"/>
+        <a:font script="Uigh" typeface="Microsoft Uighur"/>
+        <a:font script="Geor" typeface="Sylfaen"/>
+        <a:font script="Armn" typeface="Arial"/>
+        <a:font script="Bugi" typeface="Leelawadee UI"/>
+        <a:font script="Bopo" typeface="Microsoft JhengHei"/>
+        <a:font script="Java" typeface="Javanese Text"/>
+        <a:font script="Lisu" typeface="Segoe UI"/>
+        <a:font script="Mymr" typeface="Myanmar Text"/>
+        <a:font script="Nkoo" typeface="Ebrima"/>
+        <a:font script="Olck" typeface="Nirmala UI"/>
+        <a:font script="Osma" typeface="Ebrima"/>
+        <a:font script="Phag" typeface="Phagspa"/>
+        <a:font script="Syrn" typeface="Estrangelo Edessa"/>
+        <a:font script="Syrj" typeface="Estrangelo Edessa"/>
+        <a:font script="Syre" typeface="Estrangelo Edessa"/>
+        <a:font script="Sora" typeface="Nirmala UI"/>
+        <a:font script="Tale" typeface="Microsoft Tai Le"/>
+        <a:font script="Talu" typeface="Microsoft New Tai Lue"/>
+        <a:font script="Tfng" typeface="Ebrima"/>
+      </a:majorFont>
+      <a:minorFont>
+        <a:latin typeface="Calibri" panose="020F0502020204030204"/>
+        <a:ea typeface=""/>
+        <a:cs typeface=""/>
+        <a:font script="Jpan" typeface="游ゴシック"/>
+        <a:font script="Hang" typeface="맑은 고딕"/>
+        <a:font script="Hans" typeface="等线"/>
+        <a:font script="Hant" typeface="新細明體"/>
+        <a:font script="Arab" typeface="Arial"/>
+        <a:font script="Hebr" typeface="Arial"/>
+        <a:font script="Thai" typeface="Cordia New"/>
+        <a:font script="Ethi" typeface="Nyala"/>
+        <a:font script="Beng" typeface="Vrinda"/>
+        <a:font script="Gujr" typeface="Shruti"/>
+        <a:font script="Khmr" typeface="DaunPenh"/>
+        <a:font script="Knda" typeface="Tunga"/>
+        <a:font script="Guru" typeface="Raavi"/>
+        <a:font script="Cans" typeface="Euphemia"/>
+        <a:font script="Cher" typeface="Plantagenet Cherokee"/>
+        <a:font script="Yiii" typeface="Microsoft Yi Baiti"/>
+        <a:font script="Tibt" typeface="Microsoft Himalaya"/>
+        <a:font script="Thaa" typeface="MV Boli"/>
+        <a:font script="Deva" typeface="Mangal"/>
+        <a:font script="Telu" typeface="Gautami"/>
+        <a:font script="Taml" typeface="Latha"/>
+        <a:font script="Syrc" typeface="Estrangelo Edessa"/>
+        <a:font script="Orya" typeface="Kalinga"/>
+        <a:font script="Mlym" typeface="Kartika"/>
+        <a:font script="Laoo" typeface="DokChampa"/>
+        <a:font script="Sinh" typeface="Iskoola Pota"/>
+        <a:font script="Mong" typeface="Mongolian Baiti"/>
+        <a:font script="Viet" typeface="Arial"/>
+        <a:font script="Uigh" typeface="Microsoft Uighur"/>
+        <a:font script="Geor" typeface="Sylfaen"/>
+        <a:font script="Armn" typeface="Arial"/>
+        <a:font script="Bugi" typeface="Leelawadee UI"/>
+        <a:font script="Bopo" typeface="Microsoft JhengHei"/>
+        <a:font script="Java" typeface="Javanese Text"/>
+        <a:font script="Lisu" typeface="Segoe UI"/>
+        <a:font script="Mymr" typeface="Myanmar Text"/>
+        <a:font script="Nkoo" typeface="Ebrima"/>
+        <a:font script="Olck" typeface="Nirmala UI"/>
+        <a:font script="Osma" typeface="Ebrima"/>
+        <a:font script="Phag" typeface="Phagspa"/>
+        <a:font script="Syrn" typeface="Estrangelo Edessa"/>
+        <a:font script="Syrj" typeface="Estrangelo Edessa"/>
+        <a:font script="Syre" typeface="Estrangelo Edessa"/>
+        <a:font script="Sora" typeface="Nirmala UI"/>
+        <a:font script="Tale" typeface="Microsoft Tai Le"/>
+        <a:font script="Talu" typeface="Microsoft New Tai Lue"/>
+        <a:font script="Tfng" typeface="Ebrima"/>
+      </a:minorFont>
+    </a:fontScheme>
+    <a:fmtScheme name="Office">
+      <a:fillStyleLst>
+        <a:solidFill>
+          <a:schemeClr val="phClr"/>
+        </a:solidFill>
+        <a:gradFill rotWithShape="1">
+          <a:gsLst>
+            <a:gs pos="0">
+              <a:schemeClr val="phClr">
+                <a:lumMod val="110000"/>
+                <a:satMod val="105000"/>
+                <a:tint val="67000"/>
+              </a:schemeClr>
+            </a:gs>
+            <a:gs pos="50000">
+              <a:schemeClr val="phClr">
+                <a:lumMod val="105000"/>
+                <a:satMod val="103000"/>
+                <a:tint val="73000"/>
+              </a:schemeClr>
+            </a:gs>
+            <a:gs pos="100000">
+              <a:schemeClr val="phClr">
+                <a:lumMod val="105000"/>
+                <a:satMod val="109000"/>
+                <a:tint val="81000"/>
+              </a:schemeClr>
+            </a:gs>
+          </a:gsLst>
+          <a:lin ang="5400000" scaled="0"/>
+        </a:gradFill>
+        <a:gradFill rotWithShape="1">
+          <a:gsLst>
+            <a:gs pos="0">
+              <a:schemeClr val="phClr">
+                <a:satMod val="103000"/>
+                <a:lumMod val="102000"/>
+                <a:tint val="94000"/>
+              </a:schemeClr>
+            </a:gs>
+            <a:gs pos="50000">
+              <a:schemeClr val="phClr">
+                <a:satMod val="110000"/>
+                <a:lumMod val="100000"/>
+                <a:shade val="100000"/>
+              </a:schemeClr>
+            </a:gs>
+            <a:gs pos="100000">
+              <a:schemeClr val="phClr">
+                <a:lumMod val="99000"/>
+                <a:satMod val="120000"/>
+                <a:shade val="78000"/>
+              </a:schemeClr>
+            </a:gs>
+          </a:gsLst>
+          <a:lin ang="5400000" scaled="0"/>
+        </a:gradFill>
+      </a:fillStyleLst>
+      <a:lnStyleLst>
+        <a:ln w="6350" cap="flat" cmpd="sng" algn="ctr">
+          <a:solidFill>
+            <a:schemeClr val="phClr"/>
+          </a:solidFill>
+          <a:prstDash val="solid"/>
+          <a:miter lim="800000"/>
+        </a:ln>
+        <a:ln w="12700" cap="flat" cmpd="sng" algn="ctr">
+          <a:solidFill>
+            <a:schemeClr val="phClr"/>
+          </a:solidFill>
+          <a:prstDash val="solid"/>
+          <a:miter lim="800000"/>
+        </a:ln>
+        <a:ln w="19050" cap="flat" cmpd="sng" algn="ctr">
+          <a:solidFill>
+            <a:schemeClr val="phClr"/>
+          </a:solidFill>
+          <a:prstDash val="solid"/>
+          <a:miter lim="800000"/>
+        </a:ln>
+      </a:lnStyleLst>
+      <a:effectStyleLst>
+        <a:effectStyle>
+          <a:effectLst/>
+        </a:effectStyle>
+        <a:effectStyle>
+          <a:effectLst/>
+        </a:effectStyle>
+        <a:effectStyle>
+          <a:effectLst>
+            <a:outerShdw blurRad="57150" dist="19050" dir="5400000" algn="ctr" rotWithShape="0">
+              <a:srgbClr val="000000">
+                <a:alpha val="63000"/>
+              </a:srgbClr>
+            </a:outerShdw>
+          </a:effectLst>
+        </a:effectStyle>
+      </a:effectStyleLst>
+      <a:bgFillStyleLst>
+        <a:solidFill>
+          <a:schemeClr val="phClr"/>
+        </a:solidFill>
+        <a:solidFill>
+          <a:schemeClr val="phClr">
+            <a:tint val="95000"/>
+            <a:satMod val="170000"/>
+          </a:schemeClr>
+        </a:solidFill>
+        <a:gradFill rotWithShape="1">
+          <a:gsLst>
+            <a:gs pos="0">
+              <a:schemeClr val="phClr">
+                <a:tint val="93000"/>
+                <a:satMod val="150000"/>
+                <a:shade val="98000"/>
+                <a:lumMod val="102000"/>
+              </a:schemeClr>
+            </a:gs>
+            <a:gs pos="50000">
+              <a:schemeClr val="phClr">
+                <a:tint val="98000"/>
+                <a:satMod val="130000"/>
+                <a:shade val="90000"/>
+                <a:lumMod val="103000"/>
+              </a:schemeClr>
+            </a:gs>
+            <a:gs pos="100000">
+              <a:schemeClr val="phClr">
+                <a:shade val="63000"/>
+                <a:satMod val="120000"/>
+              </a:schemeClr>
+            </a:gs>
+          </a:gsLst>
+          <a:lin ang="5400000" scaled="0"/>
+        </a:gradFill>
+      </a:bgFillStyleLst>
+    </a:fmtScheme>
+  </a:themeElements>
+  <a:objectDefaults/>
+  <a:extraClrSchemeLst/>
+  <a:extLst>
+    <a:ext uri="{05A4C25C-085E-4340-85A3-A5531E510DB2}">
+      <thm15:themeFamily xmlns:thm15="http://schemas.microsoft.com/office/thememl/2012/main" name="Office Theme" id="{62F939B6-93AF-4DB8-9C6B-D6C7DFDC589F}" vid="{4A3C46E8-61CC-4603-A589-7422A47A8E4A}"/>
+    </a:ext>
+  </a:extLst>
+</a:theme>
 </file>
</xml_diff>

<commit_message>
Finalising Chapters 3 and 10
</commit_message>
<xml_diff>
--- a/Chapter10-EvaluatingModels/Chapter10.pptx
+++ b/Chapter10-EvaluatingModels/Chapter10.pptx
@@ -5,7 +5,7 @@
     <p:sldMasterId id="2147483648" r:id="rId1"/>
   </p:sldMasterIdLst>
   <p:notesMasterIdLst>
-    <p:notesMasterId r:id="rId19"/>
+    <p:notesMasterId r:id="rId23"/>
   </p:notesMasterIdLst>
   <p:sldIdLst>
     <p:sldId id="256" r:id="rId2"/>
@@ -25,6 +25,10 @@
     <p:sldId id="288" r:id="rId16"/>
     <p:sldId id="290" r:id="rId17"/>
     <p:sldId id="291" r:id="rId18"/>
+    <p:sldId id="324" r:id="rId19"/>
+    <p:sldId id="303" r:id="rId20"/>
+    <p:sldId id="304" r:id="rId21"/>
+    <p:sldId id="323" r:id="rId22"/>
   </p:sldIdLst>
   <p:sldSz cx="12192000" cy="6858000"/>
   <p:notesSz cx="6858000" cy="9144000"/>
@@ -213,7 +217,7 @@
           <a:p>
             <a:fld id="{8D8DE39F-4749-5543-BEF0-EE11E597C9A3}" type="datetimeFigureOut">
               <a:rPr lang="en-US" smtClean="0"/>
-              <a:t>11/27/18</a:t>
+              <a:t>12/11/18</a:t>
             </a:fld>
             <a:endParaRPr lang="en-US"/>
           </a:p>
@@ -818,7 +822,7 @@
           <a:p>
             <a:fld id="{53326AB7-C146-8643-AC32-1D896C71A7F3}" type="datetimeFigureOut">
               <a:rPr lang="en-US" smtClean="0"/>
-              <a:t>11/27/18</a:t>
+              <a:t>12/11/18</a:t>
             </a:fld>
             <a:endParaRPr lang="en-US"/>
           </a:p>
@@ -1016,7 +1020,7 @@
           <a:p>
             <a:fld id="{53326AB7-C146-8643-AC32-1D896C71A7F3}" type="datetimeFigureOut">
               <a:rPr lang="en-US" smtClean="0"/>
-              <a:t>11/27/18</a:t>
+              <a:t>12/11/18</a:t>
             </a:fld>
             <a:endParaRPr lang="en-US"/>
           </a:p>
@@ -1224,7 +1228,7 @@
           <a:p>
             <a:fld id="{53326AB7-C146-8643-AC32-1D896C71A7F3}" type="datetimeFigureOut">
               <a:rPr lang="en-US" smtClean="0"/>
-              <a:t>11/27/18</a:t>
+              <a:t>12/11/18</a:t>
             </a:fld>
             <a:endParaRPr lang="en-US"/>
           </a:p>
@@ -1422,7 +1426,7 @@
           <a:p>
             <a:fld id="{53326AB7-C146-8643-AC32-1D896C71A7F3}" type="datetimeFigureOut">
               <a:rPr lang="en-US" smtClean="0"/>
-              <a:t>11/27/18</a:t>
+              <a:t>12/11/18</a:t>
             </a:fld>
             <a:endParaRPr lang="en-US"/>
           </a:p>
@@ -1697,7 +1701,7 @@
           <a:p>
             <a:fld id="{53326AB7-C146-8643-AC32-1D896C71A7F3}" type="datetimeFigureOut">
               <a:rPr lang="en-US" smtClean="0"/>
-              <a:t>11/27/18</a:t>
+              <a:t>12/11/18</a:t>
             </a:fld>
             <a:endParaRPr lang="en-US"/>
           </a:p>
@@ -1962,7 +1966,7 @@
           <a:p>
             <a:fld id="{53326AB7-C146-8643-AC32-1D896C71A7F3}" type="datetimeFigureOut">
               <a:rPr lang="en-US" smtClean="0"/>
-              <a:t>11/27/18</a:t>
+              <a:t>12/11/18</a:t>
             </a:fld>
             <a:endParaRPr lang="en-US"/>
           </a:p>
@@ -2374,7 +2378,7 @@
           <a:p>
             <a:fld id="{53326AB7-C146-8643-AC32-1D896C71A7F3}" type="datetimeFigureOut">
               <a:rPr lang="en-US" smtClean="0"/>
-              <a:t>11/27/18</a:t>
+              <a:t>12/11/18</a:t>
             </a:fld>
             <a:endParaRPr lang="en-US"/>
           </a:p>
@@ -2515,7 +2519,7 @@
           <a:p>
             <a:fld id="{53326AB7-C146-8643-AC32-1D896C71A7F3}" type="datetimeFigureOut">
               <a:rPr lang="en-US" smtClean="0"/>
-              <a:t>11/27/18</a:t>
+              <a:t>12/11/18</a:t>
             </a:fld>
             <a:endParaRPr lang="en-US"/>
           </a:p>
@@ -2628,7 +2632,7 @@
           <a:p>
             <a:fld id="{53326AB7-C146-8643-AC32-1D896C71A7F3}" type="datetimeFigureOut">
               <a:rPr lang="en-US" smtClean="0"/>
-              <a:t>11/27/18</a:t>
+              <a:t>12/11/18</a:t>
             </a:fld>
             <a:endParaRPr lang="en-US"/>
           </a:p>
@@ -2939,7 +2943,7 @@
           <a:p>
             <a:fld id="{53326AB7-C146-8643-AC32-1D896C71A7F3}" type="datetimeFigureOut">
               <a:rPr lang="en-US" smtClean="0"/>
-              <a:t>11/27/18</a:t>
+              <a:t>12/11/18</a:t>
             </a:fld>
             <a:endParaRPr lang="en-US"/>
           </a:p>
@@ -3227,7 +3231,7 @@
           <a:p>
             <a:fld id="{53326AB7-C146-8643-AC32-1D896C71A7F3}" type="datetimeFigureOut">
               <a:rPr lang="en-US" smtClean="0"/>
-              <a:t>11/27/18</a:t>
+              <a:t>12/11/18</a:t>
             </a:fld>
             <a:endParaRPr lang="en-US"/>
           </a:p>
@@ -3468,7 +3472,7 @@
           <a:p>
             <a:fld id="{53326AB7-C146-8643-AC32-1D896C71A7F3}" type="datetimeFigureOut">
               <a:rPr lang="en-US" smtClean="0"/>
-              <a:t>11/27/18</a:t>
+              <a:t>12/11/18</a:t>
             </a:fld>
             <a:endParaRPr lang="en-US"/>
           </a:p>
@@ -4193,6 +4197,30 @@
               <a:t>Validation</a:t>
             </a:r>
           </a:p>
+          <a:p>
+            <a:r>
+              <a:rPr lang="en-US" dirty="0">
+                <a:solidFill>
+                  <a:schemeClr val="bg1">
+                    <a:lumMod val="50000"/>
+                  </a:schemeClr>
+                </a:solidFill>
+              </a:rPr>
+              <a:t>Summary</a:t>
+            </a:r>
+          </a:p>
+          <a:p>
+            <a:pPr marL="0" indent="0">
+              <a:buNone/>
+            </a:pPr>
+            <a:endParaRPr lang="en-US" dirty="0">
+              <a:solidFill>
+                <a:schemeClr val="bg1">
+                  <a:lumMod val="50000"/>
+                </a:schemeClr>
+              </a:solidFill>
+            </a:endParaRPr>
+          </a:p>
         </p:txBody>
       </p:sp>
     </p:spTree>
@@ -5103,6 +5131,18 @@
               <a:t>Validation</a:t>
             </a:r>
           </a:p>
+          <a:p>
+            <a:r>
+              <a:rPr lang="en-US" dirty="0">
+                <a:solidFill>
+                  <a:schemeClr val="bg1">
+                    <a:lumMod val="50000"/>
+                  </a:schemeClr>
+                </a:solidFill>
+              </a:rPr>
+              <a:t>Summary</a:t>
+            </a:r>
+          </a:p>
         </p:txBody>
       </p:sp>
     </p:spTree>
@@ -5221,6 +5261,267 @@
 </p:sld>
 </file>
 
+<file path=ppt/slides/slide18.xml><?xml version="1.0" encoding="utf-8"?>
+<p:sld xmlns:a="http://schemas.openxmlformats.org/drawingml/2006/main" xmlns:r="http://schemas.openxmlformats.org/officeDocument/2006/relationships" xmlns:p="http://schemas.openxmlformats.org/presentationml/2006/main">
+  <p:cSld>
+    <p:spTree>
+      <p:nvGrpSpPr>
+        <p:cNvPr id="1" name=""/>
+        <p:cNvGrpSpPr/>
+        <p:nvPr/>
+      </p:nvGrpSpPr>
+      <p:grpSpPr>
+        <a:xfrm>
+          <a:off x="0" y="0"/>
+          <a:ext cx="0" cy="0"/>
+          <a:chOff x="0" y="0"/>
+          <a:chExt cx="0" cy="0"/>
+        </a:xfrm>
+      </p:grpSpPr>
+      <p:sp>
+        <p:nvSpPr>
+          <p:cNvPr id="2" name="Title 1">
+            <a:extLst>
+              <a:ext uri="{FF2B5EF4-FFF2-40B4-BE49-F238E27FC236}">
+                <a16:creationId xmlns:a16="http://schemas.microsoft.com/office/drawing/2014/main" id="{7CF553B1-9ED5-0E4A-8958-2D15C88DADBC}"/>
+              </a:ext>
+            </a:extLst>
+          </p:cNvPr>
+          <p:cNvSpPr>
+            <a:spLocks noGrp="1"/>
+          </p:cNvSpPr>
+          <p:nvPr>
+            <p:ph type="title"/>
+          </p:nvPr>
+        </p:nvSpPr>
+        <p:spPr>
+          <a:xfrm>
+            <a:off x="838200" y="365125"/>
+            <a:ext cx="10515600" cy="1325563"/>
+          </a:xfrm>
+        </p:spPr>
+        <p:txBody>
+          <a:bodyPr/>
+          <a:lstStyle/>
+          <a:p>
+            <a:r>
+              <a:rPr lang="en-US" dirty="0"/>
+              <a:t>Lecture Outline</a:t>
+            </a:r>
+          </a:p>
+        </p:txBody>
+      </p:sp>
+      <p:sp>
+        <p:nvSpPr>
+          <p:cNvPr id="3" name="Content Placeholder 2">
+            <a:extLst>
+              <a:ext uri="{FF2B5EF4-FFF2-40B4-BE49-F238E27FC236}">
+                <a16:creationId xmlns:a16="http://schemas.microsoft.com/office/drawing/2014/main" id="{E9299CD1-BAA1-E446-A025-64FBB0214443}"/>
+              </a:ext>
+            </a:extLst>
+          </p:cNvPr>
+          <p:cNvSpPr>
+            <a:spLocks noGrp="1"/>
+          </p:cNvSpPr>
+          <p:nvPr>
+            <p:ph idx="1"/>
+          </p:nvPr>
+        </p:nvSpPr>
+        <p:spPr/>
+        <p:txBody>
+          <a:bodyPr/>
+          <a:lstStyle/>
+          <a:p>
+            <a:r>
+              <a:rPr lang="en-US" dirty="0">
+                <a:solidFill>
+                  <a:schemeClr val="bg1">
+                    <a:lumMod val="50000"/>
+                  </a:schemeClr>
+                </a:solidFill>
+              </a:rPr>
+              <a:t>Evaluating Models</a:t>
+            </a:r>
+          </a:p>
+          <a:p>
+            <a:r>
+              <a:rPr lang="en-US" dirty="0">
+                <a:solidFill>
+                  <a:schemeClr val="bg1">
+                    <a:lumMod val="50000"/>
+                  </a:schemeClr>
+                </a:solidFill>
+              </a:rPr>
+              <a:t>Verification</a:t>
+            </a:r>
+          </a:p>
+          <a:p>
+            <a:r>
+              <a:rPr lang="en-US" dirty="0">
+                <a:solidFill>
+                  <a:schemeClr val="bg1">
+                    <a:lumMod val="50000"/>
+                  </a:schemeClr>
+                </a:solidFill>
+              </a:rPr>
+              <a:t>Calibration</a:t>
+            </a:r>
+          </a:p>
+          <a:p>
+            <a:r>
+              <a:rPr lang="en-US" dirty="0">
+                <a:solidFill>
+                  <a:schemeClr val="bg1">
+                    <a:lumMod val="50000"/>
+                  </a:schemeClr>
+                </a:solidFill>
+              </a:rPr>
+              <a:t>Validation</a:t>
+            </a:r>
+          </a:p>
+          <a:p>
+            <a:r>
+              <a:rPr lang="en-US" dirty="0"/>
+              <a:t>Summary</a:t>
+            </a:r>
+          </a:p>
+        </p:txBody>
+      </p:sp>
+    </p:spTree>
+    <p:extLst>
+      <p:ext uri="{BB962C8B-B14F-4D97-AF65-F5344CB8AC3E}">
+        <p14:creationId xmlns:p14="http://schemas.microsoft.com/office/powerpoint/2010/main" val="2853797376"/>
+      </p:ext>
+    </p:extLst>
+  </p:cSld>
+  <p:clrMapOvr>
+    <a:masterClrMapping/>
+  </p:clrMapOvr>
+</p:sld>
+</file>
+
+<file path=ppt/slides/slide19.xml><?xml version="1.0" encoding="utf-8"?>
+<p:sld xmlns:a="http://schemas.openxmlformats.org/drawingml/2006/main" xmlns:r="http://schemas.openxmlformats.org/officeDocument/2006/relationships" xmlns:p="http://schemas.openxmlformats.org/presentationml/2006/main">
+  <p:cSld>
+    <p:spTree>
+      <p:nvGrpSpPr>
+        <p:cNvPr id="1" name=""/>
+        <p:cNvGrpSpPr/>
+        <p:nvPr/>
+      </p:nvGrpSpPr>
+      <p:grpSpPr>
+        <a:xfrm>
+          <a:off x="0" y="0"/>
+          <a:ext cx="0" cy="0"/>
+          <a:chOff x="0" y="0"/>
+          <a:chExt cx="0" cy="0"/>
+        </a:xfrm>
+      </p:grpSpPr>
+      <p:sp>
+        <p:nvSpPr>
+          <p:cNvPr id="2" name="Title 1">
+            <a:extLst>
+              <a:ext uri="{FF2B5EF4-FFF2-40B4-BE49-F238E27FC236}">
+                <a16:creationId xmlns:a16="http://schemas.microsoft.com/office/drawing/2014/main" id="{6E301968-1D4B-604C-8808-49E215F0F4B5}"/>
+              </a:ext>
+            </a:extLst>
+          </p:cNvPr>
+          <p:cNvSpPr>
+            <a:spLocks noGrp="1"/>
+          </p:cNvSpPr>
+          <p:nvPr>
+            <p:ph type="title"/>
+          </p:nvPr>
+        </p:nvSpPr>
+        <p:spPr/>
+        <p:txBody>
+          <a:bodyPr/>
+          <a:lstStyle/>
+          <a:p>
+            <a:r>
+              <a:rPr lang="en-GB" dirty="0"/>
+              <a:t>Summary</a:t>
+            </a:r>
+          </a:p>
+        </p:txBody>
+      </p:sp>
+      <p:sp>
+        <p:nvSpPr>
+          <p:cNvPr id="3" name="Content Placeholder 2">
+            <a:extLst>
+              <a:ext uri="{FF2B5EF4-FFF2-40B4-BE49-F238E27FC236}">
+                <a16:creationId xmlns:a16="http://schemas.microsoft.com/office/drawing/2014/main" id="{1DC996B5-6795-BA42-9178-521E9A658C26}"/>
+              </a:ext>
+            </a:extLst>
+          </p:cNvPr>
+          <p:cNvSpPr>
+            <a:spLocks noGrp="1"/>
+          </p:cNvSpPr>
+          <p:nvPr>
+            <p:ph idx="1"/>
+          </p:nvPr>
+        </p:nvSpPr>
+        <p:spPr>
+          <a:xfrm>
+            <a:off x="838200" y="1825625"/>
+            <a:ext cx="10515600" cy="4667250"/>
+          </a:xfrm>
+        </p:spPr>
+        <p:txBody>
+          <a:bodyPr>
+            <a:normAutofit/>
+          </a:bodyPr>
+          <a:lstStyle/>
+          <a:p>
+            <a:r>
+              <a:rPr lang="en-GB" sz="2400" dirty="0"/>
+              <a:t>Evaluation remains one of the key challenges within agent-based modelling, but is increasingly well supported by established methods for verification, calibration, and validation</a:t>
+            </a:r>
+          </a:p>
+          <a:p>
+            <a:r>
+              <a:rPr lang="en-GB" sz="2400" dirty="0"/>
+              <a:t>Verifying your code is important throughout the ABM development lifecycle, and your work should be compared against simplified or existing models</a:t>
+            </a:r>
+          </a:p>
+          <a:p>
+            <a:r>
+              <a:rPr lang="en-GB" sz="2400" dirty="0"/>
+              <a:t>Tools such as </a:t>
+            </a:r>
+            <a:r>
+              <a:rPr lang="en-GB" sz="2400" dirty="0" err="1"/>
+              <a:t>BehaviorSpace</a:t>
+            </a:r>
+            <a:r>
+              <a:rPr lang="en-GB" sz="2400" dirty="0"/>
+              <a:t> enable quick testing of parameter ranges, and ensure the model is performing as well as it can do relative to observed behaviour</a:t>
+            </a:r>
+          </a:p>
+          <a:p>
+            <a:r>
+              <a:rPr lang="en-GB" sz="2400" dirty="0"/>
+              <a:t>Sensitivity tests allow us to identify which parameters are dominating the behaviour of your agents, duly or unduly</a:t>
+            </a:r>
+          </a:p>
+          <a:p>
+            <a:endParaRPr lang="en-GB" sz="2400" dirty="0"/>
+          </a:p>
+        </p:txBody>
+      </p:sp>
+    </p:spTree>
+    <p:extLst>
+      <p:ext uri="{BB962C8B-B14F-4D97-AF65-F5344CB8AC3E}">
+        <p14:creationId xmlns:p14="http://schemas.microsoft.com/office/powerpoint/2010/main" val="2093167469"/>
+      </p:ext>
+    </p:extLst>
+  </p:cSld>
+  <p:clrMapOvr>
+    <a:masterClrMapping/>
+  </p:clrMapOvr>
+</p:sld>
+</file>
+
 <file path=ppt/slides/slide2.xml><?xml version="1.0" encoding="utf-8"?>
 <p:sld xmlns:a="http://schemas.openxmlformats.org/drawingml/2006/main" xmlns:r="http://schemas.openxmlformats.org/officeDocument/2006/relationships" xmlns:p="http://schemas.openxmlformats.org/presentationml/2006/main">
   <p:cSld>
@@ -5287,6 +5588,15 @@
           <a:bodyPr/>
           <a:lstStyle/>
           <a:p>
+            <a:pPr marL="0" indent="0">
+              <a:buNone/>
+            </a:pPr>
+            <a:r>
+              <a:rPr lang="en-US" dirty="0"/>
+              <a:t>By the end of this lecture, students will…</a:t>
+            </a:r>
+          </a:p>
+          <a:p>
             <a:r>
               <a:rPr lang="en-US" dirty="0"/>
               <a:t>Understand the importance of evaluation in ensuring wider acceptance and utility of the model</a:t>
@@ -5301,7 +5611,7 @@
           <a:p>
             <a:r>
               <a:rPr lang="en-US" dirty="0"/>
-              <a:t>Apply approaches for </a:t>
+              <a:t>Be able to apply approaches for </a:t>
             </a:r>
             <a:r>
               <a:rPr lang="en-US" dirty="0" err="1"/>
@@ -5314,8 +5624,12 @@
           </a:p>
           <a:p>
             <a:r>
+              <a:rPr lang="en-US"/>
+              <a:t>Understand </a:t>
+            </a:r>
+            <a:r>
               <a:rPr lang="en-US" dirty="0"/>
-              <a:t>Learn approaches for validating the predictions from a model relative to observed real-world conditions</a:t>
+              <a:t>approaches for validating the predictions from a model relative to observed real-world conditions</a:t>
             </a:r>
           </a:p>
         </p:txBody>
@@ -5324,6 +5638,601 @@
     <p:extLst>
       <p:ext uri="{BB962C8B-B14F-4D97-AF65-F5344CB8AC3E}">
         <p14:creationId xmlns:p14="http://schemas.microsoft.com/office/powerpoint/2010/main" val="2223974399"/>
+      </p:ext>
+    </p:extLst>
+  </p:cSld>
+  <p:clrMapOvr>
+    <a:masterClrMapping/>
+  </p:clrMapOvr>
+</p:sld>
+</file>
+
+<file path=ppt/slides/slide20.xml><?xml version="1.0" encoding="utf-8"?>
+<p:sld xmlns:a="http://schemas.openxmlformats.org/drawingml/2006/main" xmlns:r="http://schemas.openxmlformats.org/officeDocument/2006/relationships" xmlns:p="http://schemas.openxmlformats.org/presentationml/2006/main">
+  <p:cSld>
+    <p:spTree>
+      <p:nvGrpSpPr>
+        <p:cNvPr id="1" name=""/>
+        <p:cNvGrpSpPr/>
+        <p:nvPr/>
+      </p:nvGrpSpPr>
+      <p:grpSpPr>
+        <a:xfrm>
+          <a:off x="0" y="0"/>
+          <a:ext cx="0" cy="0"/>
+          <a:chOff x="0" y="0"/>
+          <a:chExt cx="0" cy="0"/>
+        </a:xfrm>
+      </p:grpSpPr>
+      <p:sp>
+        <p:nvSpPr>
+          <p:cNvPr id="2" name="Title 1">
+            <a:extLst>
+              <a:ext uri="{FF2B5EF4-FFF2-40B4-BE49-F238E27FC236}">
+                <a16:creationId xmlns:a16="http://schemas.microsoft.com/office/drawing/2014/main" id="{1DBD55E1-BC98-804C-AD40-6E14621DBDD0}"/>
+              </a:ext>
+            </a:extLst>
+          </p:cNvPr>
+          <p:cNvSpPr>
+            <a:spLocks noGrp="1"/>
+          </p:cNvSpPr>
+          <p:nvPr>
+            <p:ph type="title"/>
+          </p:nvPr>
+        </p:nvSpPr>
+        <p:spPr/>
+        <p:txBody>
+          <a:bodyPr/>
+          <a:lstStyle/>
+          <a:p>
+            <a:r>
+              <a:rPr lang="en-GB" dirty="0"/>
+              <a:t>Further Reading</a:t>
+            </a:r>
+          </a:p>
+        </p:txBody>
+      </p:sp>
+      <p:sp>
+        <p:nvSpPr>
+          <p:cNvPr id="3" name="Content Placeholder 2">
+            <a:extLst>
+              <a:ext uri="{FF2B5EF4-FFF2-40B4-BE49-F238E27FC236}">
+                <a16:creationId xmlns:a16="http://schemas.microsoft.com/office/drawing/2014/main" id="{C8A75EE7-BC8D-024E-8788-032E2F51DBB7}"/>
+              </a:ext>
+            </a:extLst>
+          </p:cNvPr>
+          <p:cNvSpPr>
+            <a:spLocks noGrp="1"/>
+          </p:cNvSpPr>
+          <p:nvPr>
+            <p:ph sz="half" idx="1"/>
+          </p:nvPr>
+        </p:nvSpPr>
+        <p:spPr>
+          <a:xfrm>
+            <a:off x="838200" y="1583111"/>
+            <a:ext cx="5181600" cy="5032375"/>
+          </a:xfrm>
+        </p:spPr>
+        <p:txBody>
+          <a:bodyPr>
+            <a:normAutofit fontScale="55000" lnSpcReduction="20000"/>
+          </a:bodyPr>
+          <a:lstStyle/>
+          <a:p>
+            <a:pPr marL="0" indent="0" algn="just">
+              <a:buNone/>
+            </a:pPr>
+            <a:r>
+              <a:rPr lang="en-GB" dirty="0"/>
+              <a:t>For an excellent chapter summary on ‘Verification, Validation, and Replication’ see Wilensky and Rand (2015). Their work has more detail on some aspects of evaluating models than described here, particularly with respect to replicating models, but focusses less on the spatial aspects of validation.</a:t>
+            </a:r>
+          </a:p>
+          <a:p>
+            <a:pPr algn="just"/>
+            <a:r>
+              <a:rPr lang="en-GB" sz="2500" i="1" dirty="0"/>
+              <a:t>Wilensky, U. and Rand, W. (2015), An Introduction to Agent-based </a:t>
+            </a:r>
+            <a:r>
+              <a:rPr lang="en-GB" sz="2500" i="1" dirty="0" err="1"/>
+              <a:t>Modeling</a:t>
+            </a:r>
+            <a:r>
+              <a:rPr lang="en-GB" sz="2500" i="1" dirty="0"/>
+              <a:t>: </a:t>
+            </a:r>
+            <a:r>
+              <a:rPr lang="en-GB" sz="2500" i="1" dirty="0" err="1"/>
+              <a:t>Modeling</a:t>
+            </a:r>
+            <a:r>
+              <a:rPr lang="en-GB" sz="2500" i="1" dirty="0"/>
+              <a:t> Natural,  Social, and Engineered Complex Systems with </a:t>
+            </a:r>
+            <a:r>
+              <a:rPr lang="en-GB" sz="2500" i="1" dirty="0" err="1"/>
+              <a:t>NetLogo</a:t>
+            </a:r>
+            <a:r>
+              <a:rPr lang="en-GB" sz="2500" i="1" dirty="0"/>
+              <a:t>, MIT Press, Cambridge, MA. </a:t>
+            </a:r>
+          </a:p>
+          <a:p>
+            <a:pPr algn="just"/>
+            <a:endParaRPr lang="en-GB" sz="600" i="1" dirty="0"/>
+          </a:p>
+          <a:p>
+            <a:pPr marL="0" indent="0" algn="just">
+              <a:buNone/>
+            </a:pPr>
+            <a:r>
+              <a:rPr lang="en-GB" dirty="0"/>
+              <a:t>While </a:t>
+            </a:r>
+            <a:r>
+              <a:rPr lang="en-GB" dirty="0" err="1"/>
+              <a:t>Railsback</a:t>
+            </a:r>
+            <a:r>
+              <a:rPr lang="en-GB" dirty="0"/>
+              <a:t> and Grimm (2011) contains a detailed discussion of Pattern Oriented Modelling and a valuable chapter on ‘Parametrisation and Calibration’ of models. </a:t>
+            </a:r>
+          </a:p>
+          <a:p>
+            <a:pPr algn="just"/>
+            <a:r>
+              <a:rPr lang="en-GB" sz="2500" i="1" dirty="0" err="1"/>
+              <a:t>Railsback</a:t>
+            </a:r>
+            <a:r>
+              <a:rPr lang="en-GB" sz="2500" i="1" dirty="0"/>
+              <a:t>, S.F. and Grimm, V. (2011), Agent-Based and Individual-Based </a:t>
+            </a:r>
+            <a:r>
+              <a:rPr lang="en-GB" sz="2500" i="1" dirty="0" err="1"/>
+              <a:t>Modeling</a:t>
+            </a:r>
+            <a:r>
+              <a:rPr lang="en-GB" sz="2500" i="1" dirty="0"/>
+              <a:t>: A Practical Introduction, Princeton University Press, Princeton, NJ. </a:t>
+            </a:r>
+          </a:p>
+          <a:p>
+            <a:pPr marL="0" indent="0" algn="just">
+              <a:buNone/>
+            </a:pPr>
+            <a:endParaRPr lang="en-GB" sz="600" i="1" dirty="0"/>
+          </a:p>
+          <a:p>
+            <a:pPr marL="0" indent="0" algn="just">
+              <a:buNone/>
+            </a:pPr>
+            <a:r>
+              <a:rPr lang="en-GB" dirty="0"/>
+              <a:t>For a wider theoretical discussions of agent-based modelling, motivation, and validation, readers are directed towards: </a:t>
+            </a:r>
+          </a:p>
+          <a:p>
+            <a:pPr algn="just"/>
+            <a:r>
+              <a:rPr lang="en-GB" sz="2500" i="1" dirty="0"/>
+              <a:t>Axtell, R. and Epstein, J.M. (1994), ’Agent-based Modelling: Understanding Our Creations’, The Bulletin of the Santa Fe Institute: Winter, 28-32. </a:t>
+            </a:r>
+          </a:p>
+          <a:p>
+            <a:pPr algn="just"/>
+            <a:r>
+              <a:rPr lang="en-GB" sz="2500" i="1" dirty="0"/>
+              <a:t>Axtell, R. (2000), Why Agents? On the Varied Motivations for Agent Computing in the Social Sciences, </a:t>
+            </a:r>
+            <a:r>
+              <a:rPr lang="en-GB" sz="2500" i="1" dirty="0" err="1"/>
+              <a:t>Center</a:t>
+            </a:r>
+            <a:r>
+              <a:rPr lang="en-GB" sz="2500" i="1" dirty="0"/>
+              <a:t> on Social and Economic Dynamics (The Brookings Institute): Working Paper 17, Washington DC. </a:t>
+            </a:r>
+          </a:p>
+        </p:txBody>
+      </p:sp>
+      <p:sp>
+        <p:nvSpPr>
+          <p:cNvPr id="7" name="Content Placeholder 6">
+            <a:extLst>
+              <a:ext uri="{FF2B5EF4-FFF2-40B4-BE49-F238E27FC236}">
+                <a16:creationId xmlns:a16="http://schemas.microsoft.com/office/drawing/2014/main" id="{88C327CE-02E3-4E66-B69F-05819BF4F380}"/>
+              </a:ext>
+            </a:extLst>
+          </p:cNvPr>
+          <p:cNvSpPr>
+            <a:spLocks noGrp="1"/>
+          </p:cNvSpPr>
+          <p:nvPr>
+            <p:ph sz="half" idx="2"/>
+          </p:nvPr>
+        </p:nvSpPr>
+        <p:spPr>
+          <a:xfrm>
+            <a:off x="6172200" y="1583112"/>
+            <a:ext cx="5181600" cy="4351338"/>
+          </a:xfrm>
+        </p:spPr>
+        <p:txBody>
+          <a:bodyPr>
+            <a:normAutofit fontScale="55000" lnSpcReduction="20000"/>
+          </a:bodyPr>
+          <a:lstStyle/>
+          <a:p>
+            <a:pPr marL="0" indent="0" algn="just">
+              <a:buNone/>
+            </a:pPr>
+            <a:r>
+              <a:rPr lang="en-GB" dirty="0"/>
+              <a:t>Not covered here is a discussion of ‘Empirical Validation’ methods, which is a dominant approach in economic agent-based modelling. For coverage of this area, readers are directed to: </a:t>
+            </a:r>
+          </a:p>
+          <a:p>
+            <a:pPr algn="just"/>
+            <a:r>
+              <a:rPr lang="en-GB" sz="2500" i="1" dirty="0" err="1"/>
+              <a:t>Windrum</a:t>
+            </a:r>
+            <a:r>
+              <a:rPr lang="en-GB" sz="2500" i="1" dirty="0"/>
+              <a:t>, P., </a:t>
+            </a:r>
+            <a:r>
+              <a:rPr lang="en-GB" sz="2500" i="1" dirty="0" err="1"/>
+              <a:t>Fagiolo</a:t>
+            </a:r>
+            <a:r>
+              <a:rPr lang="en-GB" sz="2500" i="1" dirty="0"/>
+              <a:t>, G. and Moneta, A. (2007), ’Empirical Validation of Agent-based Models: Alternatives and Prospects’, Journal of Artificial Societies and Social Simulation, 10(2): 8, Available at http://</a:t>
+            </a:r>
+            <a:r>
+              <a:rPr lang="en-GB" sz="2500" i="1" dirty="0" err="1"/>
+              <a:t>jasss.soc.surrey.ac.uk</a:t>
+            </a:r>
+            <a:r>
+              <a:rPr lang="en-GB" sz="2500" i="1" dirty="0"/>
+              <a:t>/10/2/8.html. </a:t>
+            </a:r>
+          </a:p>
+          <a:p>
+            <a:pPr marL="0" indent="0" algn="just">
+              <a:buNone/>
+            </a:pPr>
+            <a:endParaRPr lang="en-GB" sz="600" i="1" dirty="0"/>
+          </a:p>
+          <a:p>
+            <a:pPr marL="0" indent="0" algn="just">
+              <a:buNone/>
+            </a:pPr>
+            <a:r>
+              <a:rPr lang="en-GB" dirty="0"/>
+              <a:t>While for a comparative analysis of ‘empirical’ and ‘companion’ validation approaches, readers are referred to: </a:t>
+            </a:r>
+          </a:p>
+          <a:p>
+            <a:pPr algn="just"/>
+            <a:r>
+              <a:rPr lang="en-GB" sz="2500" i="1" dirty="0"/>
+              <a:t>Moss, S. (2008), ’Alternative Approaches to the Empirical Validation of Agent-based Models’, Journal of Artificial Societies and Social Simulation, 11(1): 5, Available at http://</a:t>
+            </a:r>
+            <a:r>
+              <a:rPr lang="en-GB" sz="2500" i="1" dirty="0" err="1"/>
+              <a:t>jasss.soc.surrey.ac</a:t>
+            </a:r>
+            <a:r>
+              <a:rPr lang="en-GB" sz="2500" i="1" dirty="0"/>
+              <a:t>. </a:t>
+            </a:r>
+            <a:r>
+              <a:rPr lang="en-GB" sz="2500" i="1" dirty="0" err="1"/>
+              <a:t>uk</a:t>
+            </a:r>
+            <a:r>
+              <a:rPr lang="en-GB" sz="2500" i="1" dirty="0"/>
+              <a:t>/11/1/5.html. </a:t>
+            </a:r>
+          </a:p>
+          <a:p>
+            <a:pPr algn="just"/>
+            <a:endParaRPr lang="en-GB" dirty="0"/>
+          </a:p>
+        </p:txBody>
+      </p:sp>
+    </p:spTree>
+    <p:extLst>
+      <p:ext uri="{BB962C8B-B14F-4D97-AF65-F5344CB8AC3E}">
+        <p14:creationId xmlns:p14="http://schemas.microsoft.com/office/powerpoint/2010/main" val="1400804184"/>
+      </p:ext>
+    </p:extLst>
+  </p:cSld>
+  <p:clrMapOvr>
+    <a:masterClrMapping/>
+  </p:clrMapOvr>
+</p:sld>
+</file>
+
+<file path=ppt/slides/slide21.xml><?xml version="1.0" encoding="utf-8"?>
+<p:sld xmlns:a="http://schemas.openxmlformats.org/drawingml/2006/main" xmlns:r="http://schemas.openxmlformats.org/officeDocument/2006/relationships" xmlns:p="http://schemas.openxmlformats.org/presentationml/2006/main">
+  <p:cSld>
+    <p:bg>
+      <p:bgPr>
+        <a:solidFill>
+          <a:schemeClr val="bg1"/>
+        </a:solidFill>
+        <a:effectLst/>
+      </p:bgPr>
+    </p:bg>
+    <p:spTree>
+      <p:nvGrpSpPr>
+        <p:cNvPr id="1" name=""/>
+        <p:cNvGrpSpPr/>
+        <p:nvPr/>
+      </p:nvGrpSpPr>
+      <p:grpSpPr>
+        <a:xfrm>
+          <a:off x="0" y="0"/>
+          <a:ext cx="0" cy="0"/>
+          <a:chOff x="0" y="0"/>
+          <a:chExt cx="0" cy="0"/>
+        </a:xfrm>
+      </p:grpSpPr>
+      <p:sp>
+        <p:nvSpPr>
+          <p:cNvPr id="9" name="Rectangle 8">
+            <a:extLst>
+              <a:ext uri="{FF2B5EF4-FFF2-40B4-BE49-F238E27FC236}">
+                <a16:creationId xmlns:a16="http://schemas.microsoft.com/office/drawing/2014/main" id="{867D4867-5BA7-4462-B2F6-A23F4A622AA7}"/>
+              </a:ext>
+              <a:ext uri="{C183D7F6-B498-43B3-948B-1728B52AA6E4}">
+                <adec:decorative xmlns:adec="http://schemas.microsoft.com/office/drawing/2017/decorative" val="1"/>
+              </a:ext>
+            </a:extLst>
+          </p:cNvPr>
+          <p:cNvSpPr>
+            <a:spLocks noGrp="1" noRot="1" noChangeAspect="1" noMove="1" noResize="1" noEditPoints="1" noAdjustHandles="1" noChangeArrowheads="1" noChangeShapeType="1" noTextEdit="1"/>
+          </p:cNvSpPr>
+          <p:nvPr>
+            <p:extLst>
+              <p:ext uri="{386F3935-93C4-4BCD-93E2-E3B085C9AB24}">
+                <p16:designElem xmlns:p16="http://schemas.microsoft.com/office/powerpoint/2015/main" val="1"/>
+              </p:ext>
+            </p:extLst>
+          </p:nvPr>
+        </p:nvSpPr>
+        <p:spPr>
+          <a:xfrm>
+            <a:off x="0" y="0"/>
+            <a:ext cx="4654296" cy="6858000"/>
+          </a:xfrm>
+          <a:prstGeom prst="rect">
+            <a:avLst/>
+          </a:prstGeom>
+          <a:solidFill>
+            <a:schemeClr val="tx1">
+              <a:lumMod val="75000"/>
+              <a:lumOff val="25000"/>
+            </a:schemeClr>
+          </a:solidFill>
+          <a:ln>
+            <a:noFill/>
+          </a:ln>
+        </p:spPr>
+        <p:style>
+          <a:lnRef idx="0">
+            <a:scrgbClr r="0" g="0" b="0"/>
+          </a:lnRef>
+          <a:fillRef idx="0">
+            <a:scrgbClr r="0" g="0" b="0"/>
+          </a:fillRef>
+          <a:effectRef idx="0">
+            <a:scrgbClr r="0" g="0" b="0"/>
+          </a:effectRef>
+          <a:fontRef idx="minor">
+            <a:schemeClr val="lt1"/>
+          </a:fontRef>
+        </p:style>
+        <p:txBody>
+          <a:bodyPr rtlCol="0" anchor="ctr"/>
+          <a:lstStyle/>
+          <a:p>
+            <a:pPr marL="0" marR="0" lvl="0" indent="0" algn="ctr" defTabSz="914400" rtl="0" eaLnBrk="1" fontAlgn="auto" latinLnBrk="0" hangingPunct="1">
+              <a:lnSpc>
+                <a:spcPct val="100000"/>
+              </a:lnSpc>
+              <a:spcBef>
+                <a:spcPts val="0"/>
+              </a:spcBef>
+              <a:spcAft>
+                <a:spcPts val="0"/>
+              </a:spcAft>
+              <a:buClrTx/>
+              <a:buSzTx/>
+              <a:buFontTx/>
+              <a:buNone/>
+              <a:tabLst/>
+              <a:defRPr/>
+            </a:pPr>
+            <a:endParaRPr kumimoji="0" lang="en-US" sz="1800" b="0" i="0" u="none" strike="noStrike" kern="1200" cap="none" spc="0" normalizeH="0" baseline="0" noProof="0">
+              <a:ln>
+                <a:noFill/>
+              </a:ln>
+              <a:solidFill>
+                <a:prstClr val="white"/>
+              </a:solidFill>
+              <a:effectLst/>
+              <a:uLnTx/>
+              <a:uFillTx/>
+              <a:latin typeface="Calibri" panose="020F0502020204030204"/>
+              <a:ea typeface="+mn-ea"/>
+              <a:cs typeface="+mn-cs"/>
+            </a:endParaRPr>
+          </a:p>
+        </p:txBody>
+      </p:sp>
+      <p:sp>
+        <p:nvSpPr>
+          <p:cNvPr id="2" name="Title 1">
+            <a:extLst>
+              <a:ext uri="{FF2B5EF4-FFF2-40B4-BE49-F238E27FC236}">
+                <a16:creationId xmlns:a16="http://schemas.microsoft.com/office/drawing/2014/main" id="{6B4E48AF-0D9F-D64D-A9F0-BBB2574BDF9E}"/>
+              </a:ext>
+            </a:extLst>
+          </p:cNvPr>
+          <p:cNvSpPr>
+            <a:spLocks noGrp="1"/>
+          </p:cNvSpPr>
+          <p:nvPr>
+            <p:ph type="title"/>
+          </p:nvPr>
+        </p:nvSpPr>
+        <p:spPr>
+          <a:xfrm>
+            <a:off x="643467" y="643467"/>
+            <a:ext cx="3363974" cy="1597315"/>
+          </a:xfrm>
+          <a:noFill/>
+          <a:ln w="19050">
+            <a:solidFill>
+              <a:schemeClr val="bg1"/>
+            </a:solidFill>
+          </a:ln>
+        </p:spPr>
+        <p:txBody>
+          <a:bodyPr wrap="square">
+            <a:normAutofit/>
+          </a:bodyPr>
+          <a:lstStyle/>
+          <a:p>
+            <a:pPr algn="ctr"/>
+            <a:r>
+              <a:rPr lang="en-US" sz="2800" dirty="0">
+                <a:solidFill>
+                  <a:schemeClr val="bg1"/>
+                </a:solidFill>
+              </a:rPr>
+              <a:t>Online Resources</a:t>
+            </a:r>
+          </a:p>
+        </p:txBody>
+      </p:sp>
+      <p:sp>
+        <p:nvSpPr>
+          <p:cNvPr id="3" name="Content Placeholder 2">
+            <a:extLst>
+              <a:ext uri="{FF2B5EF4-FFF2-40B4-BE49-F238E27FC236}">
+                <a16:creationId xmlns:a16="http://schemas.microsoft.com/office/drawing/2014/main" id="{8CABB726-5031-D24A-96A2-5824434A56F2}"/>
+              </a:ext>
+            </a:extLst>
+          </p:cNvPr>
+          <p:cNvSpPr>
+            <a:spLocks noGrp="1"/>
+          </p:cNvSpPr>
+          <p:nvPr>
+            <p:ph idx="1"/>
+          </p:nvPr>
+        </p:nvSpPr>
+        <p:spPr>
+          <a:xfrm>
+            <a:off x="643468" y="2638044"/>
+            <a:ext cx="3363974" cy="3415622"/>
+          </a:xfrm>
+        </p:spPr>
+        <p:txBody>
+          <a:bodyPr>
+            <a:normAutofit/>
+          </a:bodyPr>
+          <a:lstStyle/>
+          <a:p>
+            <a:r>
+              <a:rPr lang="en-US" sz="2000" dirty="0">
+                <a:solidFill>
+                  <a:schemeClr val="bg1"/>
+                </a:solidFill>
+              </a:rPr>
+              <a:t>Visit: </a:t>
+            </a:r>
+            <a:r>
+              <a:rPr lang="en-US" sz="2000" dirty="0">
+                <a:solidFill>
+                  <a:schemeClr val="bg1"/>
+                </a:solidFill>
+                <a:hlinkClick r:id="rId2"/>
+              </a:rPr>
+              <a:t>www.abmgis.org/Chapter10.html</a:t>
+            </a:r>
+            <a:r>
+              <a:rPr lang="en-US" sz="2000" dirty="0">
+                <a:solidFill>
+                  <a:schemeClr val="bg1"/>
+                </a:solidFill>
+              </a:rPr>
+              <a:t> for a selection of models to highlight core concepts introduced in this chapter </a:t>
+            </a:r>
+          </a:p>
+          <a:p>
+            <a:endParaRPr lang="en-US" sz="2000" dirty="0">
+              <a:solidFill>
+                <a:schemeClr val="bg1"/>
+              </a:solidFill>
+            </a:endParaRPr>
+          </a:p>
+          <a:p>
+            <a:endParaRPr lang="en-US" sz="2000" dirty="0">
+              <a:solidFill>
+                <a:schemeClr val="bg1"/>
+              </a:solidFill>
+            </a:endParaRPr>
+          </a:p>
+          <a:p>
+            <a:endParaRPr lang="en-US" sz="2000" dirty="0">
+              <a:solidFill>
+                <a:schemeClr val="bg1"/>
+              </a:solidFill>
+            </a:endParaRPr>
+          </a:p>
+        </p:txBody>
+      </p:sp>
+      <p:pic>
+        <p:nvPicPr>
+          <p:cNvPr id="6" name="Content Placeholder 4">
+            <a:extLst>
+              <a:ext uri="{FF2B5EF4-FFF2-40B4-BE49-F238E27FC236}">
+                <a16:creationId xmlns:a16="http://schemas.microsoft.com/office/drawing/2014/main" id="{86F38BFC-6DFF-BA41-A181-51388DC0C86F}"/>
+              </a:ext>
+            </a:extLst>
+          </p:cNvPr>
+          <p:cNvPicPr>
+            <a:picLocks noChangeAspect="1"/>
+          </p:cNvPicPr>
+          <p:nvPr/>
+        </p:nvPicPr>
+        <p:blipFill>
+          <a:blip r:embed="rId3"/>
+          <a:stretch>
+            <a:fillRect/>
+          </a:stretch>
+        </p:blipFill>
+        <p:spPr>
+          <a:xfrm>
+            <a:off x="4303059" y="-28685"/>
+            <a:ext cx="8247529" cy="6886685"/>
+          </a:xfrm>
+          <a:prstGeom prst="rect">
+            <a:avLst/>
+          </a:prstGeom>
+        </p:spPr>
+      </p:pic>
+    </p:spTree>
+    <p:extLst>
+      <p:ext uri="{BB962C8B-B14F-4D97-AF65-F5344CB8AC3E}">
+        <p14:creationId xmlns:p14="http://schemas.microsoft.com/office/powerpoint/2010/main" val="549654287"/>
       </p:ext>
     </p:extLst>
   </p:cSld>
@@ -5444,6 +6353,30 @@
               </a:rPr>
               <a:t>Validation</a:t>
             </a:r>
+          </a:p>
+          <a:p>
+            <a:r>
+              <a:rPr lang="en-US" dirty="0">
+                <a:solidFill>
+                  <a:schemeClr val="bg1">
+                    <a:lumMod val="50000"/>
+                  </a:schemeClr>
+                </a:solidFill>
+              </a:rPr>
+              <a:t>Summary</a:t>
+            </a:r>
+          </a:p>
+          <a:p>
+            <a:pPr marL="0" indent="0">
+              <a:buNone/>
+            </a:pPr>
+            <a:endParaRPr lang="en-US" dirty="0">
+              <a:solidFill>
+                <a:schemeClr val="bg1">
+                  <a:lumMod val="50000"/>
+                </a:schemeClr>
+              </a:solidFill>
+            </a:endParaRPr>
           </a:p>
         </p:txBody>
       </p:sp>
@@ -5814,6 +6747,27 @@
               </a:rPr>
               <a:t>Validation</a:t>
             </a:r>
+          </a:p>
+          <a:p>
+            <a:r>
+              <a:rPr lang="en-US" dirty="0">
+                <a:solidFill>
+                  <a:schemeClr val="bg1">
+                    <a:lumMod val="50000"/>
+                  </a:schemeClr>
+                </a:solidFill>
+              </a:rPr>
+              <a:t>Summary</a:t>
+            </a:r>
+          </a:p>
+          <a:p>
+            <a:endParaRPr lang="en-US" dirty="0">
+              <a:solidFill>
+                <a:schemeClr val="bg1">
+                  <a:lumMod val="50000"/>
+                </a:schemeClr>
+              </a:solidFill>
+            </a:endParaRPr>
           </a:p>
         </p:txBody>
       </p:sp>

</xml_diff>